<commit_message>
apresentação com nomes de SD e ajustes no trabalho escrito
</commit_message>
<xml_diff>
--- a/7semestre/SD/TP1/apresentação-big-data.pptx
+++ b/7semestre/SD/TP1/apresentação-big-data.pptx
@@ -4,6 +4,9 @@
   <p:sldMasterIdLst>
     <p:sldMasterId id="2147483816" r:id="rId1"/>
   </p:sldMasterIdLst>
+  <p:notesMasterIdLst>
+    <p:notesMasterId r:id="rId16"/>
+  </p:notesMasterIdLst>
   <p:sldIdLst>
     <p:sldId id="256" r:id="rId2"/>
     <p:sldId id="258" r:id="rId3"/>
@@ -120,6 +123,440 @@
 </p:presentation>
 </file>
 
+<file path=ppt/notesMasters/notesMaster1.xml><?xml version="1.0" encoding="utf-8"?>
+<p:notesMaster xmlns:a="http://schemas.openxmlformats.org/drawingml/2006/main" xmlns:r="http://schemas.openxmlformats.org/officeDocument/2006/relationships" xmlns:p="http://schemas.openxmlformats.org/presentationml/2006/main">
+  <p:cSld>
+    <p:bg>
+      <p:bgRef idx="1001">
+        <a:schemeClr val="bg1"/>
+      </p:bgRef>
+    </p:bg>
+    <p:spTree>
+      <p:nvGrpSpPr>
+        <p:cNvPr id="1" name=""/>
+        <p:cNvGrpSpPr/>
+        <p:nvPr/>
+      </p:nvGrpSpPr>
+      <p:grpSpPr>
+        <a:xfrm>
+          <a:off x="0" y="0"/>
+          <a:ext cx="0" cy="0"/>
+          <a:chOff x="0" y="0"/>
+          <a:chExt cx="0" cy="0"/>
+        </a:xfrm>
+      </p:grpSpPr>
+      <p:sp>
+        <p:nvSpPr>
+          <p:cNvPr id="2" name="Espaço Reservado para Cabeçalho 1"/>
+          <p:cNvSpPr>
+            <a:spLocks noGrp="1"/>
+          </p:cNvSpPr>
+          <p:nvPr>
+            <p:ph type="hdr" sz="quarter"/>
+          </p:nvPr>
+        </p:nvSpPr>
+        <p:spPr>
+          <a:xfrm>
+            <a:off x="0" y="0"/>
+            <a:ext cx="2971800" cy="457200"/>
+          </a:xfrm>
+          <a:prstGeom prst="rect">
+            <a:avLst/>
+          </a:prstGeom>
+        </p:spPr>
+        <p:txBody>
+          <a:bodyPr vert="horz" lIns="91440" tIns="45720" rIns="91440" bIns="45720" rtlCol="0"/>
+          <a:lstStyle>
+            <a:lvl1pPr algn="l">
+              <a:defRPr sz="1200"/>
+            </a:lvl1pPr>
+          </a:lstStyle>
+          <a:p>
+            <a:endParaRPr lang="pt-BR"/>
+          </a:p>
+        </p:txBody>
+      </p:sp>
+      <p:sp>
+        <p:nvSpPr>
+          <p:cNvPr id="3" name="Espaço Reservado para Data 2"/>
+          <p:cNvSpPr>
+            <a:spLocks noGrp="1"/>
+          </p:cNvSpPr>
+          <p:nvPr>
+            <p:ph type="dt" idx="1"/>
+          </p:nvPr>
+        </p:nvSpPr>
+        <p:spPr>
+          <a:xfrm>
+            <a:off x="3884613" y="0"/>
+            <a:ext cx="2971800" cy="457200"/>
+          </a:xfrm>
+          <a:prstGeom prst="rect">
+            <a:avLst/>
+          </a:prstGeom>
+        </p:spPr>
+        <p:txBody>
+          <a:bodyPr vert="horz" lIns="91440" tIns="45720" rIns="91440" bIns="45720" rtlCol="0"/>
+          <a:lstStyle>
+            <a:lvl1pPr algn="r">
+              <a:defRPr sz="1200"/>
+            </a:lvl1pPr>
+          </a:lstStyle>
+          <a:p>
+            <a:fld id="{68317235-F7D2-48E3-B154-03A1286A789D}" type="datetimeFigureOut">
+              <a:rPr lang="pt-BR" smtClean="0"/>
+              <a:t>09/05/2015</a:t>
+            </a:fld>
+            <a:endParaRPr lang="pt-BR"/>
+          </a:p>
+        </p:txBody>
+      </p:sp>
+      <p:sp>
+        <p:nvSpPr>
+          <p:cNvPr id="4" name="Espaço Reservado para Imagem de Slide 3"/>
+          <p:cNvSpPr>
+            <a:spLocks noGrp="1" noRot="1" noChangeAspect="1"/>
+          </p:cNvSpPr>
+          <p:nvPr>
+            <p:ph type="sldImg" idx="2"/>
+          </p:nvPr>
+        </p:nvSpPr>
+        <p:spPr>
+          <a:xfrm>
+            <a:off x="1143000" y="685800"/>
+            <a:ext cx="4572000" cy="3429000"/>
+          </a:xfrm>
+          <a:prstGeom prst="rect">
+            <a:avLst/>
+          </a:prstGeom>
+          <a:noFill/>
+          <a:ln w="12700">
+            <a:solidFill>
+              <a:prstClr val="black"/>
+            </a:solidFill>
+          </a:ln>
+        </p:spPr>
+        <p:txBody>
+          <a:bodyPr vert="horz" lIns="91440" tIns="45720" rIns="91440" bIns="45720" rtlCol="0" anchor="ctr"/>
+          <a:lstStyle/>
+          <a:p>
+            <a:endParaRPr lang="pt-BR"/>
+          </a:p>
+        </p:txBody>
+      </p:sp>
+      <p:sp>
+        <p:nvSpPr>
+          <p:cNvPr id="5" name="Espaço Reservado para Anotações 4"/>
+          <p:cNvSpPr>
+            <a:spLocks noGrp="1"/>
+          </p:cNvSpPr>
+          <p:nvPr>
+            <p:ph type="body" sz="quarter" idx="3"/>
+          </p:nvPr>
+        </p:nvSpPr>
+        <p:spPr>
+          <a:xfrm>
+            <a:off x="685800" y="4343400"/>
+            <a:ext cx="5486400" cy="4114800"/>
+          </a:xfrm>
+          <a:prstGeom prst="rect">
+            <a:avLst/>
+          </a:prstGeom>
+        </p:spPr>
+        <p:txBody>
+          <a:bodyPr vert="horz" lIns="91440" tIns="45720" rIns="91440" bIns="45720" rtlCol="0"/>
+          <a:lstStyle/>
+          <a:p>
+            <a:pPr lvl="0"/>
+            <a:r>
+              <a:rPr lang="pt-BR" smtClean="0"/>
+              <a:t>Clique para editar o texto mestre</a:t>
+            </a:r>
+          </a:p>
+          <a:p>
+            <a:pPr lvl="1"/>
+            <a:r>
+              <a:rPr lang="pt-BR" smtClean="0"/>
+              <a:t>Segundo nível</a:t>
+            </a:r>
+          </a:p>
+          <a:p>
+            <a:pPr lvl="2"/>
+            <a:r>
+              <a:rPr lang="pt-BR" smtClean="0"/>
+              <a:t>Terceiro nível</a:t>
+            </a:r>
+          </a:p>
+          <a:p>
+            <a:pPr lvl="3"/>
+            <a:r>
+              <a:rPr lang="pt-BR" smtClean="0"/>
+              <a:t>Quarto nível</a:t>
+            </a:r>
+          </a:p>
+          <a:p>
+            <a:pPr lvl="4"/>
+            <a:r>
+              <a:rPr lang="pt-BR" smtClean="0"/>
+              <a:t>Quinto nível</a:t>
+            </a:r>
+            <a:endParaRPr lang="pt-BR"/>
+          </a:p>
+        </p:txBody>
+      </p:sp>
+      <p:sp>
+        <p:nvSpPr>
+          <p:cNvPr id="6" name="Espaço Reservado para Rodapé 5"/>
+          <p:cNvSpPr>
+            <a:spLocks noGrp="1"/>
+          </p:cNvSpPr>
+          <p:nvPr>
+            <p:ph type="ftr" sz="quarter" idx="4"/>
+          </p:nvPr>
+        </p:nvSpPr>
+        <p:spPr>
+          <a:xfrm>
+            <a:off x="0" y="8685213"/>
+            <a:ext cx="2971800" cy="457200"/>
+          </a:xfrm>
+          <a:prstGeom prst="rect">
+            <a:avLst/>
+          </a:prstGeom>
+        </p:spPr>
+        <p:txBody>
+          <a:bodyPr vert="horz" lIns="91440" tIns="45720" rIns="91440" bIns="45720" rtlCol="0" anchor="b"/>
+          <a:lstStyle>
+            <a:lvl1pPr algn="l">
+              <a:defRPr sz="1200"/>
+            </a:lvl1pPr>
+          </a:lstStyle>
+          <a:p>
+            <a:endParaRPr lang="pt-BR"/>
+          </a:p>
+        </p:txBody>
+      </p:sp>
+      <p:sp>
+        <p:nvSpPr>
+          <p:cNvPr id="7" name="Espaço Reservado para Número de Slide 6"/>
+          <p:cNvSpPr>
+            <a:spLocks noGrp="1"/>
+          </p:cNvSpPr>
+          <p:nvPr>
+            <p:ph type="sldNum" sz="quarter" idx="5"/>
+          </p:nvPr>
+        </p:nvSpPr>
+        <p:spPr>
+          <a:xfrm>
+            <a:off x="3884613" y="8685213"/>
+            <a:ext cx="2971800" cy="457200"/>
+          </a:xfrm>
+          <a:prstGeom prst="rect">
+            <a:avLst/>
+          </a:prstGeom>
+        </p:spPr>
+        <p:txBody>
+          <a:bodyPr vert="horz" lIns="91440" tIns="45720" rIns="91440" bIns="45720" rtlCol="0" anchor="b"/>
+          <a:lstStyle>
+            <a:lvl1pPr algn="r">
+              <a:defRPr sz="1200"/>
+            </a:lvl1pPr>
+          </a:lstStyle>
+          <a:p>
+            <a:fld id="{EEA1D0D1-67C9-4243-8EAD-95F50285F0A3}" type="slidenum">
+              <a:rPr lang="pt-BR" smtClean="0"/>
+              <a:t>‹nº›</a:t>
+            </a:fld>
+            <a:endParaRPr lang="pt-BR"/>
+          </a:p>
+        </p:txBody>
+      </p:sp>
+    </p:spTree>
+    <p:extLst>
+      <p:ext uri="{BB962C8B-B14F-4D97-AF65-F5344CB8AC3E}">
+        <p14:creationId xmlns:p14="http://schemas.microsoft.com/office/powerpoint/2010/main" val="765160773"/>
+      </p:ext>
+    </p:extLst>
+  </p:cSld>
+  <p:clrMap bg1="lt1" tx1="dk1" bg2="lt2" tx2="dk2" accent1="accent1" accent2="accent2" accent3="accent3" accent4="accent4" accent5="accent5" accent6="accent6" hlink="hlink" folHlink="folHlink"/>
+  <p:notesStyle>
+    <a:lvl1pPr marL="0" algn="l" defTabSz="914400" rtl="0" eaLnBrk="1" latinLnBrk="0" hangingPunct="1">
+      <a:defRPr sz="1200" kern="1200">
+        <a:solidFill>
+          <a:schemeClr val="tx1"/>
+        </a:solidFill>
+        <a:latin typeface="+mn-lt"/>
+        <a:ea typeface="+mn-ea"/>
+        <a:cs typeface="+mn-cs"/>
+      </a:defRPr>
+    </a:lvl1pPr>
+    <a:lvl2pPr marL="457200" algn="l" defTabSz="914400" rtl="0" eaLnBrk="1" latinLnBrk="0" hangingPunct="1">
+      <a:defRPr sz="1200" kern="1200">
+        <a:solidFill>
+          <a:schemeClr val="tx1"/>
+        </a:solidFill>
+        <a:latin typeface="+mn-lt"/>
+        <a:ea typeface="+mn-ea"/>
+        <a:cs typeface="+mn-cs"/>
+      </a:defRPr>
+    </a:lvl2pPr>
+    <a:lvl3pPr marL="914400" algn="l" defTabSz="914400" rtl="0" eaLnBrk="1" latinLnBrk="0" hangingPunct="1">
+      <a:defRPr sz="1200" kern="1200">
+        <a:solidFill>
+          <a:schemeClr val="tx1"/>
+        </a:solidFill>
+        <a:latin typeface="+mn-lt"/>
+        <a:ea typeface="+mn-ea"/>
+        <a:cs typeface="+mn-cs"/>
+      </a:defRPr>
+    </a:lvl3pPr>
+    <a:lvl4pPr marL="1371600" algn="l" defTabSz="914400" rtl="0" eaLnBrk="1" latinLnBrk="0" hangingPunct="1">
+      <a:defRPr sz="1200" kern="1200">
+        <a:solidFill>
+          <a:schemeClr val="tx1"/>
+        </a:solidFill>
+        <a:latin typeface="+mn-lt"/>
+        <a:ea typeface="+mn-ea"/>
+        <a:cs typeface="+mn-cs"/>
+      </a:defRPr>
+    </a:lvl4pPr>
+    <a:lvl5pPr marL="1828800" algn="l" defTabSz="914400" rtl="0" eaLnBrk="1" latinLnBrk="0" hangingPunct="1">
+      <a:defRPr sz="1200" kern="1200">
+        <a:solidFill>
+          <a:schemeClr val="tx1"/>
+        </a:solidFill>
+        <a:latin typeface="+mn-lt"/>
+        <a:ea typeface="+mn-ea"/>
+        <a:cs typeface="+mn-cs"/>
+      </a:defRPr>
+    </a:lvl5pPr>
+    <a:lvl6pPr marL="2286000" algn="l" defTabSz="914400" rtl="0" eaLnBrk="1" latinLnBrk="0" hangingPunct="1">
+      <a:defRPr sz="1200" kern="1200">
+        <a:solidFill>
+          <a:schemeClr val="tx1"/>
+        </a:solidFill>
+        <a:latin typeface="+mn-lt"/>
+        <a:ea typeface="+mn-ea"/>
+        <a:cs typeface="+mn-cs"/>
+      </a:defRPr>
+    </a:lvl6pPr>
+    <a:lvl7pPr marL="2743200" algn="l" defTabSz="914400" rtl="0" eaLnBrk="1" latinLnBrk="0" hangingPunct="1">
+      <a:defRPr sz="1200" kern="1200">
+        <a:solidFill>
+          <a:schemeClr val="tx1"/>
+        </a:solidFill>
+        <a:latin typeface="+mn-lt"/>
+        <a:ea typeface="+mn-ea"/>
+        <a:cs typeface="+mn-cs"/>
+      </a:defRPr>
+    </a:lvl7pPr>
+    <a:lvl8pPr marL="3200400" algn="l" defTabSz="914400" rtl="0" eaLnBrk="1" latinLnBrk="0" hangingPunct="1">
+      <a:defRPr sz="1200" kern="1200">
+        <a:solidFill>
+          <a:schemeClr val="tx1"/>
+        </a:solidFill>
+        <a:latin typeface="+mn-lt"/>
+        <a:ea typeface="+mn-ea"/>
+        <a:cs typeface="+mn-cs"/>
+      </a:defRPr>
+    </a:lvl8pPr>
+    <a:lvl9pPr marL="3657600" algn="l" defTabSz="914400" rtl="0" eaLnBrk="1" latinLnBrk="0" hangingPunct="1">
+      <a:defRPr sz="1200" kern="1200">
+        <a:solidFill>
+          <a:schemeClr val="tx1"/>
+        </a:solidFill>
+        <a:latin typeface="+mn-lt"/>
+        <a:ea typeface="+mn-ea"/>
+        <a:cs typeface="+mn-cs"/>
+      </a:defRPr>
+    </a:lvl9pPr>
+  </p:notesStyle>
+</p:notesMaster>
+</file>
+
+<file path=ppt/notesSlides/notesSlide1.xml><?xml version="1.0" encoding="utf-8"?>
+<p:notes xmlns:a="http://schemas.openxmlformats.org/drawingml/2006/main" xmlns:r="http://schemas.openxmlformats.org/officeDocument/2006/relationships" xmlns:p="http://schemas.openxmlformats.org/presentationml/2006/main">
+  <p:cSld>
+    <p:spTree>
+      <p:nvGrpSpPr>
+        <p:cNvPr id="1" name=""/>
+        <p:cNvGrpSpPr/>
+        <p:nvPr/>
+      </p:nvGrpSpPr>
+      <p:grpSpPr>
+        <a:xfrm>
+          <a:off x="0" y="0"/>
+          <a:ext cx="0" cy="0"/>
+          <a:chOff x="0" y="0"/>
+          <a:chExt cx="0" cy="0"/>
+        </a:xfrm>
+      </p:grpSpPr>
+      <p:sp>
+        <p:nvSpPr>
+          <p:cNvPr id="2" name="Espaço Reservado para Imagem de Slide 1"/>
+          <p:cNvSpPr>
+            <a:spLocks noGrp="1" noRot="1" noChangeAspect="1"/>
+          </p:cNvSpPr>
+          <p:nvPr>
+            <p:ph type="sldImg"/>
+          </p:nvPr>
+        </p:nvSpPr>
+        <p:spPr/>
+      </p:sp>
+      <p:sp>
+        <p:nvSpPr>
+          <p:cNvPr id="3" name="Espaço Reservado para Anotações 2"/>
+          <p:cNvSpPr>
+            <a:spLocks noGrp="1"/>
+          </p:cNvSpPr>
+          <p:nvPr>
+            <p:ph type="body" idx="1"/>
+          </p:nvPr>
+        </p:nvSpPr>
+        <p:spPr/>
+        <p:txBody>
+          <a:bodyPr/>
+          <a:lstStyle/>
+          <a:p>
+            <a:endParaRPr lang="pt-BR" dirty="0"/>
+          </a:p>
+        </p:txBody>
+      </p:sp>
+      <p:sp>
+        <p:nvSpPr>
+          <p:cNvPr id="4" name="Espaço Reservado para Número de Slide 3"/>
+          <p:cNvSpPr>
+            <a:spLocks noGrp="1"/>
+          </p:cNvSpPr>
+          <p:nvPr>
+            <p:ph type="sldNum" sz="quarter" idx="10"/>
+          </p:nvPr>
+        </p:nvSpPr>
+        <p:spPr/>
+        <p:txBody>
+          <a:bodyPr/>
+          <a:lstStyle/>
+          <a:p>
+            <a:fld id="{EEA1D0D1-67C9-4243-8EAD-95F50285F0A3}" type="slidenum">
+              <a:rPr lang="pt-BR" smtClean="0"/>
+              <a:t>2</a:t>
+            </a:fld>
+            <a:endParaRPr lang="pt-BR"/>
+          </a:p>
+        </p:txBody>
+      </p:sp>
+    </p:spTree>
+    <p:extLst>
+      <p:ext uri="{BB962C8B-B14F-4D97-AF65-F5344CB8AC3E}">
+        <p14:creationId xmlns:p14="http://schemas.microsoft.com/office/powerpoint/2010/main" val="3191026840"/>
+      </p:ext>
+    </p:extLst>
+  </p:cSld>
+  <p:clrMapOvr>
+    <a:masterClrMapping/>
+  </p:clrMapOvr>
+</p:notes>
+</file>
+
 <file path=ppt/slideLayouts/slideLayout1.xml><?xml version="1.0" encoding="utf-8"?>
 <p:sldLayout xmlns:a="http://schemas.openxmlformats.org/drawingml/2006/main" xmlns:r="http://schemas.openxmlformats.org/officeDocument/2006/relationships" xmlns:p="http://schemas.openxmlformats.org/presentationml/2006/main" showMasterSp="0" type="title" preserve="1">
   <p:cSld name="Slide de título">
@@ -257,7 +694,7 @@
           <a:p>
             <a:fld id="{CED55966-867C-4DF6-9017-DB6EB259E626}" type="datetimeFigureOut">
               <a:rPr lang="pt-BR" smtClean="0"/>
-              <a:t>21/02/2015</a:t>
+              <a:t>09/05/2015</a:t>
             </a:fld>
             <a:endParaRPr lang="pt-BR"/>
           </a:p>
@@ -1126,7 +1563,7 @@
           <a:p>
             <a:fld id="{CED55966-867C-4DF6-9017-DB6EB259E626}" type="datetimeFigureOut">
               <a:rPr lang="pt-BR" smtClean="0"/>
-              <a:t>21/02/2015</a:t>
+              <a:t>09/05/2015</a:t>
             </a:fld>
             <a:endParaRPr lang="pt-BR"/>
           </a:p>
@@ -1301,7 +1738,7 @@
           <a:p>
             <a:fld id="{CED55966-867C-4DF6-9017-DB6EB259E626}" type="datetimeFigureOut">
               <a:rPr lang="pt-BR" smtClean="0"/>
-              <a:t>21/02/2015</a:t>
+              <a:t>09/05/2015</a:t>
             </a:fld>
             <a:endParaRPr lang="pt-BR"/>
           </a:p>
@@ -1471,7 +1908,7 @@
           <a:p>
             <a:fld id="{CED55966-867C-4DF6-9017-DB6EB259E626}" type="datetimeFigureOut">
               <a:rPr lang="pt-BR" smtClean="0"/>
-              <a:t>21/02/2015</a:t>
+              <a:t>09/05/2015</a:t>
             </a:fld>
             <a:endParaRPr lang="pt-BR"/>
           </a:p>
@@ -1681,7 +2118,7 @@
           <a:p>
             <a:fld id="{CED55966-867C-4DF6-9017-DB6EB259E626}" type="datetimeFigureOut">
               <a:rPr lang="pt-BR" smtClean="0"/>
-              <a:t>21/02/2015</a:t>
+              <a:t>09/05/2015</a:t>
             </a:fld>
             <a:endParaRPr lang="pt-BR"/>
           </a:p>
@@ -2495,7 +2932,7 @@
           <a:p>
             <a:fld id="{CED55966-867C-4DF6-9017-DB6EB259E626}" type="datetimeFigureOut">
               <a:rPr lang="pt-BR" smtClean="0"/>
-              <a:t>21/02/2015</a:t>
+              <a:t>09/05/2015</a:t>
             </a:fld>
             <a:endParaRPr lang="pt-BR"/>
           </a:p>
@@ -2731,7 +3168,7 @@
           <a:p>
             <a:fld id="{CED55966-867C-4DF6-9017-DB6EB259E626}" type="datetimeFigureOut">
               <a:rPr lang="pt-BR" smtClean="0"/>
-              <a:t>21/02/2015</a:t>
+              <a:t>09/05/2015</a:t>
             </a:fld>
             <a:endParaRPr lang="pt-BR"/>
           </a:p>
@@ -3054,7 +3491,7 @@
           <a:p>
             <a:fld id="{CED55966-867C-4DF6-9017-DB6EB259E626}" type="datetimeFigureOut">
               <a:rPr lang="pt-BR" smtClean="0"/>
-              <a:t>21/02/2015</a:t>
+              <a:t>09/05/2015</a:t>
             </a:fld>
             <a:endParaRPr lang="pt-BR"/>
           </a:p>
@@ -3144,7 +3581,7 @@
           <a:p>
             <a:fld id="{CED55966-867C-4DF6-9017-DB6EB259E626}" type="datetimeFigureOut">
               <a:rPr lang="pt-BR" smtClean="0"/>
-              <a:t>21/02/2015</a:t>
+              <a:t>09/05/2015</a:t>
             </a:fld>
             <a:endParaRPr lang="pt-BR"/>
           </a:p>
@@ -3661,7 +4098,7 @@
           <a:p>
             <a:fld id="{CED55966-867C-4DF6-9017-DB6EB259E626}" type="datetimeFigureOut">
               <a:rPr lang="pt-BR" smtClean="0"/>
-              <a:t>21/02/2015</a:t>
+              <a:t>09/05/2015</a:t>
             </a:fld>
             <a:endParaRPr lang="pt-BR"/>
           </a:p>
@@ -4172,7 +4609,7 @@
           <a:p>
             <a:fld id="{CED55966-867C-4DF6-9017-DB6EB259E626}" type="datetimeFigureOut">
               <a:rPr lang="pt-BR" smtClean="0"/>
-              <a:t>21/02/2015</a:t>
+              <a:t>09/05/2015</a:t>
             </a:fld>
             <a:endParaRPr lang="pt-BR"/>
           </a:p>
@@ -4417,7 +4854,7 @@
           <a:p>
             <a:fld id="{CED55966-867C-4DF6-9017-DB6EB259E626}" type="datetimeFigureOut">
               <a:rPr lang="pt-BR" smtClean="0"/>
-              <a:t>21/02/2015</a:t>
+              <a:t>09/05/2015</a:t>
             </a:fld>
             <a:endParaRPr lang="pt-BR"/>
           </a:p>
@@ -5488,6 +5925,35 @@
           </a:p>
         </p:txBody>
       </p:sp>
+      <p:sp>
+        <p:nvSpPr>
+          <p:cNvPr id="6" name="CaixaDeTexto 5"/>
+          <p:cNvSpPr txBox="1"/>
+          <p:nvPr/>
+        </p:nvSpPr>
+        <p:spPr>
+          <a:xfrm>
+            <a:off x="8161046" y="6474241"/>
+            <a:ext cx="553357" cy="246221"/>
+          </a:xfrm>
+          <a:prstGeom prst="rect">
+            <a:avLst/>
+          </a:prstGeom>
+          <a:noFill/>
+        </p:spPr>
+        <p:txBody>
+          <a:bodyPr wrap="none" rtlCol="0">
+            <a:spAutoFit/>
+          </a:bodyPr>
+          <a:lstStyle/>
+          <a:p>
+            <a:r>
+              <a:rPr lang="pt-BR" sz="1000" dirty="0" smtClean="0"/>
+              <a:t>Flávio</a:t>
+            </a:r>
+          </a:p>
+        </p:txBody>
+      </p:sp>
     </p:spTree>
     <p:extLst>
       <p:ext uri="{BB962C8B-B14F-4D97-AF65-F5344CB8AC3E}">
@@ -5623,6 +6089,36 @@
           </a:prstGeom>
         </p:spPr>
       </p:pic>
+      <p:sp>
+        <p:nvSpPr>
+          <p:cNvPr id="5" name="CaixaDeTexto 4"/>
+          <p:cNvSpPr txBox="1"/>
+          <p:nvPr/>
+        </p:nvSpPr>
+        <p:spPr>
+          <a:xfrm>
+            <a:off x="8051352" y="6533978"/>
+            <a:ext cx="608757" cy="246221"/>
+          </a:xfrm>
+          <a:prstGeom prst="rect">
+            <a:avLst/>
+          </a:prstGeom>
+          <a:noFill/>
+        </p:spPr>
+        <p:txBody>
+          <a:bodyPr wrap="square" rtlCol="0">
+            <a:spAutoFit/>
+          </a:bodyPr>
+          <a:lstStyle/>
+          <a:p>
+            <a:r>
+              <a:rPr lang="pt-BR" sz="1000" dirty="0" smtClean="0"/>
+              <a:t>Rafael</a:t>
+            </a:r>
+            <a:endParaRPr lang="pt-BR" sz="1000" dirty="0"/>
+          </a:p>
+        </p:txBody>
+      </p:sp>
     </p:spTree>
     <p:extLst>
       <p:ext uri="{BB962C8B-B14F-4D97-AF65-F5344CB8AC3E}">
@@ -6000,6 +6496,35 @@
           </a:p>
         </p:txBody>
       </p:sp>
+      <p:sp>
+        <p:nvSpPr>
+          <p:cNvPr id="3" name="CaixaDeTexto 2"/>
+          <p:cNvSpPr txBox="1"/>
+          <p:nvPr/>
+        </p:nvSpPr>
+        <p:spPr>
+          <a:xfrm>
+            <a:off x="8129509" y="6473952"/>
+            <a:ext cx="553357" cy="246221"/>
+          </a:xfrm>
+          <a:prstGeom prst="rect">
+            <a:avLst/>
+          </a:prstGeom>
+          <a:noFill/>
+        </p:spPr>
+        <p:txBody>
+          <a:bodyPr wrap="none" rtlCol="0">
+            <a:spAutoFit/>
+          </a:bodyPr>
+          <a:lstStyle/>
+          <a:p>
+            <a:r>
+              <a:rPr lang="pt-BR" sz="1000" dirty="0" smtClean="0"/>
+              <a:t>Flávio</a:t>
+            </a:r>
+          </a:p>
+        </p:txBody>
+      </p:sp>
     </p:spTree>
     <p:extLst>
       <p:ext uri="{BB962C8B-B14F-4D97-AF65-F5344CB8AC3E}">
@@ -6201,6 +6726,36 @@
           </a:sp3d>
         </p:spPr>
       </p:pic>
+      <p:sp>
+        <p:nvSpPr>
+          <p:cNvPr id="5" name="CaixaDeTexto 4"/>
+          <p:cNvSpPr txBox="1"/>
+          <p:nvPr/>
+        </p:nvSpPr>
+        <p:spPr>
+          <a:xfrm>
+            <a:off x="8172400" y="6528662"/>
+            <a:ext cx="566181" cy="246221"/>
+          </a:xfrm>
+          <a:prstGeom prst="rect">
+            <a:avLst/>
+          </a:prstGeom>
+          <a:noFill/>
+        </p:spPr>
+        <p:txBody>
+          <a:bodyPr wrap="none" rtlCol="0">
+            <a:spAutoFit/>
+          </a:bodyPr>
+          <a:lstStyle/>
+          <a:p>
+            <a:r>
+              <a:rPr lang="pt-BR" sz="1000" dirty="0" smtClean="0"/>
+              <a:t>Rafael</a:t>
+            </a:r>
+            <a:endParaRPr lang="pt-BR" sz="1000" dirty="0"/>
+          </a:p>
+        </p:txBody>
+      </p:sp>
     </p:spTree>
     <p:extLst>
       <p:ext uri="{BB962C8B-B14F-4D97-AF65-F5344CB8AC3E}">
@@ -6454,6 +7009,35 @@
           </a:p>
         </p:txBody>
       </p:sp>
+      <p:sp>
+        <p:nvSpPr>
+          <p:cNvPr id="2" name="CaixaDeTexto 1"/>
+          <p:cNvSpPr txBox="1"/>
+          <p:nvPr/>
+        </p:nvSpPr>
+        <p:spPr>
+          <a:xfrm>
+            <a:off x="8172400" y="6540872"/>
+            <a:ext cx="553357" cy="246221"/>
+          </a:xfrm>
+          <a:prstGeom prst="rect">
+            <a:avLst/>
+          </a:prstGeom>
+          <a:noFill/>
+        </p:spPr>
+        <p:txBody>
+          <a:bodyPr wrap="none" rtlCol="0">
+            <a:spAutoFit/>
+          </a:bodyPr>
+          <a:lstStyle/>
+          <a:p>
+            <a:r>
+              <a:rPr lang="pt-BR" sz="1000" dirty="0" smtClean="0"/>
+              <a:t>Flávio</a:t>
+            </a:r>
+          </a:p>
+        </p:txBody>
+      </p:sp>
     </p:spTree>
     <p:extLst>
       <p:ext uri="{BB962C8B-B14F-4D97-AF65-F5344CB8AC3E}">
@@ -6464,6 +7048,14 @@
   <p:clrMapOvr>
     <a:masterClrMapping/>
   </p:clrMapOvr>
+  <mc:AlternateContent xmlns:mc="http://schemas.openxmlformats.org/markup-compatibility/2006">
+    <mc:Choice xmlns:p14="http://schemas.microsoft.com/office/powerpoint/2010/main" Requires="p14">
+      <p:transition spd="slow" p14:dur="2000"/>
+    </mc:Choice>
+    <mc:Fallback>
+      <p:transition spd="slow"/>
+    </mc:Fallback>
+  </mc:AlternateContent>
   <p:timing>
     <p:tnLst>
       <p:par>
@@ -6633,6 +7225,35 @@
           </a:prstGeom>
         </p:spPr>
       </p:pic>
+      <p:sp>
+        <p:nvSpPr>
+          <p:cNvPr id="5" name="CaixaDeTexto 4"/>
+          <p:cNvSpPr txBox="1"/>
+          <p:nvPr/>
+        </p:nvSpPr>
+        <p:spPr>
+          <a:xfrm>
+            <a:off x="8182283" y="6534739"/>
+            <a:ext cx="566181" cy="246221"/>
+          </a:xfrm>
+          <a:prstGeom prst="rect">
+            <a:avLst/>
+          </a:prstGeom>
+          <a:noFill/>
+        </p:spPr>
+        <p:txBody>
+          <a:bodyPr wrap="none" rtlCol="0">
+            <a:spAutoFit/>
+          </a:bodyPr>
+          <a:lstStyle/>
+          <a:p>
+            <a:r>
+              <a:rPr lang="pt-BR" sz="1000" dirty="0" smtClean="0"/>
+              <a:t>Rafael</a:t>
+            </a:r>
+          </a:p>
+        </p:txBody>
+      </p:sp>
     </p:spTree>
     <p:extLst>
       <p:ext uri="{BB962C8B-B14F-4D97-AF65-F5344CB8AC3E}">
@@ -6764,6 +7385,35 @@
           </a:p>
         </p:txBody>
       </p:sp>
+      <p:sp>
+        <p:nvSpPr>
+          <p:cNvPr id="4" name="CaixaDeTexto 3"/>
+          <p:cNvSpPr txBox="1"/>
+          <p:nvPr/>
+        </p:nvSpPr>
+        <p:spPr>
+          <a:xfrm>
+            <a:off x="8100392" y="6521924"/>
+            <a:ext cx="646331" cy="246221"/>
+          </a:xfrm>
+          <a:prstGeom prst="rect">
+            <a:avLst/>
+          </a:prstGeom>
+          <a:noFill/>
+        </p:spPr>
+        <p:txBody>
+          <a:bodyPr wrap="none" rtlCol="0">
+            <a:spAutoFit/>
+          </a:bodyPr>
+          <a:lstStyle/>
+          <a:p>
+            <a:r>
+              <a:rPr lang="pt-BR" sz="1000" dirty="0" smtClean="0"/>
+              <a:t>Weslley</a:t>
+            </a:r>
+          </a:p>
+        </p:txBody>
+      </p:sp>
     </p:spTree>
     <p:extLst>
       <p:ext uri="{BB962C8B-B14F-4D97-AF65-F5344CB8AC3E}">
@@ -6902,6 +7552,35 @@
           </a:p>
         </p:txBody>
       </p:sp>
+      <p:sp>
+        <p:nvSpPr>
+          <p:cNvPr id="4" name="CaixaDeTexto 3"/>
+          <p:cNvSpPr txBox="1"/>
+          <p:nvPr/>
+        </p:nvSpPr>
+        <p:spPr>
+          <a:xfrm>
+            <a:off x="8195107" y="6567155"/>
+            <a:ext cx="553357" cy="246221"/>
+          </a:xfrm>
+          <a:prstGeom prst="rect">
+            <a:avLst/>
+          </a:prstGeom>
+          <a:noFill/>
+        </p:spPr>
+        <p:txBody>
+          <a:bodyPr wrap="none" rtlCol="0">
+            <a:spAutoFit/>
+          </a:bodyPr>
+          <a:lstStyle/>
+          <a:p>
+            <a:r>
+              <a:rPr lang="pt-BR" sz="1000" dirty="0" smtClean="0"/>
+              <a:t>Flávio</a:t>
+            </a:r>
+          </a:p>
+        </p:txBody>
+      </p:sp>
     </p:spTree>
     <p:extLst>
       <p:ext uri="{BB962C8B-B14F-4D97-AF65-F5344CB8AC3E}">
@@ -7058,6 +7737,35 @@
           </a:p>
         </p:txBody>
       </p:sp>
+      <p:sp>
+        <p:nvSpPr>
+          <p:cNvPr id="4" name="CaixaDeTexto 3"/>
+          <p:cNvSpPr txBox="1"/>
+          <p:nvPr/>
+        </p:nvSpPr>
+        <p:spPr>
+          <a:xfrm>
+            <a:off x="8195107" y="6567155"/>
+            <a:ext cx="553357" cy="246221"/>
+          </a:xfrm>
+          <a:prstGeom prst="rect">
+            <a:avLst/>
+          </a:prstGeom>
+          <a:noFill/>
+        </p:spPr>
+        <p:txBody>
+          <a:bodyPr wrap="none" rtlCol="0">
+            <a:spAutoFit/>
+          </a:bodyPr>
+          <a:lstStyle/>
+          <a:p>
+            <a:r>
+              <a:rPr lang="pt-BR" sz="1000" dirty="0" smtClean="0"/>
+              <a:t>Flávio</a:t>
+            </a:r>
+          </a:p>
+        </p:txBody>
+      </p:sp>
     </p:spTree>
     <p:extLst>
       <p:ext uri="{BB962C8B-B14F-4D97-AF65-F5344CB8AC3E}">
@@ -7195,6 +7903,35 @@
           </a:p>
         </p:txBody>
       </p:sp>
+      <p:sp>
+        <p:nvSpPr>
+          <p:cNvPr id="4" name="CaixaDeTexto 3"/>
+          <p:cNvSpPr txBox="1"/>
+          <p:nvPr/>
+        </p:nvSpPr>
+        <p:spPr>
+          <a:xfrm>
+            <a:off x="8100392" y="6534803"/>
+            <a:ext cx="646331" cy="246221"/>
+          </a:xfrm>
+          <a:prstGeom prst="rect">
+            <a:avLst/>
+          </a:prstGeom>
+          <a:noFill/>
+        </p:spPr>
+        <p:txBody>
+          <a:bodyPr wrap="none" rtlCol="0">
+            <a:spAutoFit/>
+          </a:bodyPr>
+          <a:lstStyle/>
+          <a:p>
+            <a:r>
+              <a:rPr lang="pt-BR" sz="1000" dirty="0" smtClean="0"/>
+              <a:t>Weslley</a:t>
+            </a:r>
+          </a:p>
+        </p:txBody>
+      </p:sp>
     </p:spTree>
     <p:extLst>
       <p:ext uri="{BB962C8B-B14F-4D97-AF65-F5344CB8AC3E}">
@@ -7282,19 +8019,7 @@
           <a:p>
             <a:r>
               <a:rPr lang="pt-BR" dirty="0" smtClean="0"/>
-              <a:t>Hospital Canadense, usou para monitorar </a:t>
-            </a:r>
-            <a:r>
-              <a:rPr lang="pt-BR" smtClean="0"/>
-              <a:t>os </a:t>
-            </a:r>
-            <a:r>
-              <a:rPr lang="pt-BR" smtClean="0"/>
-              <a:t>bebês </a:t>
-            </a:r>
-            <a:r>
-              <a:rPr lang="pt-BR" dirty="0" smtClean="0"/>
-              <a:t>prematuros;</a:t>
+              <a:t>Hospital Canadense, usou para monitorar os bebês prematuros;</a:t>
             </a:r>
           </a:p>
           <a:p>
@@ -7327,6 +8052,36 @@
               <a:t>-sal;</a:t>
             </a:r>
             <a:endParaRPr lang="pt-BR" dirty="0"/>
+          </a:p>
+        </p:txBody>
+      </p:sp>
+      <p:sp>
+        <p:nvSpPr>
+          <p:cNvPr id="2" name="CaixaDeTexto 1"/>
+          <p:cNvSpPr txBox="1"/>
+          <p:nvPr/>
+        </p:nvSpPr>
+        <p:spPr>
+          <a:xfrm>
+            <a:off x="8172400" y="6535796"/>
+            <a:ext cx="566181" cy="246221"/>
+          </a:xfrm>
+          <a:prstGeom prst="rect">
+            <a:avLst/>
+          </a:prstGeom>
+          <a:noFill/>
+        </p:spPr>
+        <p:txBody>
+          <a:bodyPr wrap="none" rtlCol="0">
+            <a:spAutoFit/>
+          </a:bodyPr>
+          <a:lstStyle/>
+          <a:p>
+            <a:r>
+              <a:rPr lang="pt-BR" sz="1000" dirty="0" smtClean="0"/>
+              <a:t>Rafael</a:t>
+            </a:r>
+            <a:endParaRPr lang="pt-BR" sz="1000" dirty="0"/>
           </a:p>
         </p:txBody>
       </p:sp>
@@ -7500,6 +8255,36 @@
               <a:t>Nome do elefante do filho do principal nome do projeto.</a:t>
             </a:r>
             <a:endParaRPr lang="pt-BR" dirty="0"/>
+          </a:p>
+        </p:txBody>
+      </p:sp>
+      <p:sp>
+        <p:nvSpPr>
+          <p:cNvPr id="4" name="CaixaDeTexto 3"/>
+          <p:cNvSpPr txBox="1"/>
+          <p:nvPr/>
+        </p:nvSpPr>
+        <p:spPr>
+          <a:xfrm>
+            <a:off x="8100392" y="6539165"/>
+            <a:ext cx="646331" cy="246221"/>
+          </a:xfrm>
+          <a:prstGeom prst="rect">
+            <a:avLst/>
+          </a:prstGeom>
+          <a:noFill/>
+        </p:spPr>
+        <p:txBody>
+          <a:bodyPr wrap="none" rtlCol="0">
+            <a:spAutoFit/>
+          </a:bodyPr>
+          <a:lstStyle/>
+          <a:p>
+            <a:r>
+              <a:rPr lang="pt-BR" sz="1000" dirty="0" smtClean="0"/>
+              <a:t>Weslley</a:t>
+            </a:r>
+            <a:endParaRPr lang="pt-BR" sz="1000" dirty="0"/>
           </a:p>
         </p:txBody>
       </p:sp>
@@ -7816,4 +8601,289 @@
   <a:objectDefaults/>
   <a:extraClrSchemeLst/>
 </a:theme>
+</file>
+
+<file path=ppt/theme/theme2.xml><?xml version="1.0" encoding="utf-8"?>
+<a:theme xmlns:a="http://schemas.openxmlformats.org/drawingml/2006/main" name="Tema do Office">
+  <a:themeElements>
+    <a:clrScheme name="Escritório">
+      <a:dk1>
+        <a:sysClr val="windowText" lastClr="000000"/>
+      </a:dk1>
+      <a:lt1>
+        <a:sysClr val="window" lastClr="FFFFFF"/>
+      </a:lt1>
+      <a:dk2>
+        <a:srgbClr val="1F497D"/>
+      </a:dk2>
+      <a:lt2>
+        <a:srgbClr val="EEECE1"/>
+      </a:lt2>
+      <a:accent1>
+        <a:srgbClr val="4F81BD"/>
+      </a:accent1>
+      <a:accent2>
+        <a:srgbClr val="C0504D"/>
+      </a:accent2>
+      <a:accent3>
+        <a:srgbClr val="9BBB59"/>
+      </a:accent3>
+      <a:accent4>
+        <a:srgbClr val="8064A2"/>
+      </a:accent4>
+      <a:accent5>
+        <a:srgbClr val="4BACC6"/>
+      </a:accent5>
+      <a:accent6>
+        <a:srgbClr val="F79646"/>
+      </a:accent6>
+      <a:hlink>
+        <a:srgbClr val="0000FF"/>
+      </a:hlink>
+      <a:folHlink>
+        <a:srgbClr val="800080"/>
+      </a:folHlink>
+    </a:clrScheme>
+    <a:fontScheme name="Escritório">
+      <a:majorFont>
+        <a:latin typeface="Calibri"/>
+        <a:ea typeface=""/>
+        <a:cs typeface=""/>
+        <a:font script="Jpan" typeface="ＭＳ Ｐゴシック"/>
+        <a:font script="Hang" typeface="맑은 고딕"/>
+        <a:font script="Hans" typeface="宋体"/>
+        <a:font script="Hant" typeface="新細明體"/>
+        <a:font script="Arab" typeface="Times New Roman"/>
+        <a:font script="Hebr" typeface="Times New Roman"/>
+        <a:font script="Thai" typeface="Angsana New"/>
+        <a:font script="Ethi" typeface="Nyala"/>
+        <a:font script="Beng" typeface="Vrinda"/>
+        <a:font script="Gujr" typeface="Shruti"/>
+        <a:font script="Khmr" typeface="MoolBoran"/>
+        <a:font script="Knda" typeface="Tunga"/>
+        <a:font script="Guru" typeface="Raavi"/>
+        <a:font script="Cans" typeface="Euphemia"/>
+        <a:font script="Cher" typeface="Plantagenet Cherokee"/>
+        <a:font script="Yiii" typeface="Microsoft Yi Baiti"/>
+        <a:font script="Tibt" typeface="Microsoft Himalaya"/>
+        <a:font script="Thaa" typeface="MV Boli"/>
+        <a:font script="Deva" typeface="Mangal"/>
+        <a:font script="Telu" typeface="Gautami"/>
+        <a:font script="Taml" typeface="Latha"/>
+        <a:font script="Syrc" typeface="Estrangelo Edessa"/>
+        <a:font script="Orya" typeface="Kalinga"/>
+        <a:font script="Mlym" typeface="Kartika"/>
+        <a:font script="Laoo" typeface="DokChampa"/>
+        <a:font script="Sinh" typeface="Iskoola Pota"/>
+        <a:font script="Mong" typeface="Mongolian Baiti"/>
+        <a:font script="Viet" typeface="Times New Roman"/>
+        <a:font script="Uigh" typeface="Microsoft Uighur"/>
+        <a:font script="Geor" typeface="Sylfaen"/>
+      </a:majorFont>
+      <a:minorFont>
+        <a:latin typeface="Calibri"/>
+        <a:ea typeface=""/>
+        <a:cs typeface=""/>
+        <a:font script="Jpan" typeface="ＭＳ Ｐゴシック"/>
+        <a:font script="Hang" typeface="맑은 고딕"/>
+        <a:font script="Hans" typeface="宋体"/>
+        <a:font script="Hant" typeface="新細明體"/>
+        <a:font script="Arab" typeface="Arial"/>
+        <a:font script="Hebr" typeface="Arial"/>
+        <a:font script="Thai" typeface="Cordia New"/>
+        <a:font script="Ethi" typeface="Nyala"/>
+        <a:font script="Beng" typeface="Vrinda"/>
+        <a:font script="Gujr" typeface="Shruti"/>
+        <a:font script="Khmr" typeface="DaunPenh"/>
+        <a:font script="Knda" typeface="Tunga"/>
+        <a:font script="Guru" typeface="Raavi"/>
+        <a:font script="Cans" typeface="Euphemia"/>
+        <a:font script="Cher" typeface="Plantagenet Cherokee"/>
+        <a:font script="Yiii" typeface="Microsoft Yi Baiti"/>
+        <a:font script="Tibt" typeface="Microsoft Himalaya"/>
+        <a:font script="Thaa" typeface="MV Boli"/>
+        <a:font script="Deva" typeface="Mangal"/>
+        <a:font script="Telu" typeface="Gautami"/>
+        <a:font script="Taml" typeface="Latha"/>
+        <a:font script="Syrc" typeface="Estrangelo Edessa"/>
+        <a:font script="Orya" typeface="Kalinga"/>
+        <a:font script="Mlym" typeface="Kartika"/>
+        <a:font script="Laoo" typeface="DokChampa"/>
+        <a:font script="Sinh" typeface="Iskoola Pota"/>
+        <a:font script="Mong" typeface="Mongolian Baiti"/>
+        <a:font script="Viet" typeface="Arial"/>
+        <a:font script="Uigh" typeface="Microsoft Uighur"/>
+        <a:font script="Geor" typeface="Sylfaen"/>
+      </a:minorFont>
+    </a:fontScheme>
+    <a:fmtScheme name="Escritório">
+      <a:fillStyleLst>
+        <a:solidFill>
+          <a:schemeClr val="phClr"/>
+        </a:solidFill>
+        <a:gradFill rotWithShape="1">
+          <a:gsLst>
+            <a:gs pos="0">
+              <a:schemeClr val="phClr">
+                <a:tint val="50000"/>
+                <a:satMod val="300000"/>
+              </a:schemeClr>
+            </a:gs>
+            <a:gs pos="35000">
+              <a:schemeClr val="phClr">
+                <a:tint val="37000"/>
+                <a:satMod val="300000"/>
+              </a:schemeClr>
+            </a:gs>
+            <a:gs pos="100000">
+              <a:schemeClr val="phClr">
+                <a:tint val="15000"/>
+                <a:satMod val="350000"/>
+              </a:schemeClr>
+            </a:gs>
+          </a:gsLst>
+          <a:lin ang="16200000" scaled="1"/>
+        </a:gradFill>
+        <a:gradFill rotWithShape="1">
+          <a:gsLst>
+            <a:gs pos="0">
+              <a:schemeClr val="phClr">
+                <a:shade val="51000"/>
+                <a:satMod val="130000"/>
+              </a:schemeClr>
+            </a:gs>
+            <a:gs pos="80000">
+              <a:schemeClr val="phClr">
+                <a:shade val="93000"/>
+                <a:satMod val="130000"/>
+              </a:schemeClr>
+            </a:gs>
+            <a:gs pos="100000">
+              <a:schemeClr val="phClr">
+                <a:shade val="94000"/>
+                <a:satMod val="135000"/>
+              </a:schemeClr>
+            </a:gs>
+          </a:gsLst>
+          <a:lin ang="16200000" scaled="0"/>
+        </a:gradFill>
+      </a:fillStyleLst>
+      <a:lnStyleLst>
+        <a:ln w="9525" cap="flat" cmpd="sng" algn="ctr">
+          <a:solidFill>
+            <a:schemeClr val="phClr">
+              <a:shade val="95000"/>
+              <a:satMod val="105000"/>
+            </a:schemeClr>
+          </a:solidFill>
+          <a:prstDash val="solid"/>
+        </a:ln>
+        <a:ln w="25400" cap="flat" cmpd="sng" algn="ctr">
+          <a:solidFill>
+            <a:schemeClr val="phClr"/>
+          </a:solidFill>
+          <a:prstDash val="solid"/>
+        </a:ln>
+        <a:ln w="38100" cap="flat" cmpd="sng" algn="ctr">
+          <a:solidFill>
+            <a:schemeClr val="phClr"/>
+          </a:solidFill>
+          <a:prstDash val="solid"/>
+        </a:ln>
+      </a:lnStyleLst>
+      <a:effectStyleLst>
+        <a:effectStyle>
+          <a:effectLst>
+            <a:outerShdw blurRad="40000" dist="20000" dir="5400000" rotWithShape="0">
+              <a:srgbClr val="000000">
+                <a:alpha val="38000"/>
+              </a:srgbClr>
+            </a:outerShdw>
+          </a:effectLst>
+        </a:effectStyle>
+        <a:effectStyle>
+          <a:effectLst>
+            <a:outerShdw blurRad="40000" dist="23000" dir="5400000" rotWithShape="0">
+              <a:srgbClr val="000000">
+                <a:alpha val="35000"/>
+              </a:srgbClr>
+            </a:outerShdw>
+          </a:effectLst>
+        </a:effectStyle>
+        <a:effectStyle>
+          <a:effectLst>
+            <a:outerShdw blurRad="40000" dist="23000" dir="5400000" rotWithShape="0">
+              <a:srgbClr val="000000">
+                <a:alpha val="35000"/>
+              </a:srgbClr>
+            </a:outerShdw>
+          </a:effectLst>
+          <a:scene3d>
+            <a:camera prst="orthographicFront">
+              <a:rot lat="0" lon="0" rev="0"/>
+            </a:camera>
+            <a:lightRig rig="threePt" dir="t">
+              <a:rot lat="0" lon="0" rev="1200000"/>
+            </a:lightRig>
+          </a:scene3d>
+          <a:sp3d>
+            <a:bevelT w="63500" h="25400"/>
+          </a:sp3d>
+        </a:effectStyle>
+      </a:effectStyleLst>
+      <a:bgFillStyleLst>
+        <a:solidFill>
+          <a:schemeClr val="phClr"/>
+        </a:solidFill>
+        <a:gradFill rotWithShape="1">
+          <a:gsLst>
+            <a:gs pos="0">
+              <a:schemeClr val="phClr">
+                <a:tint val="40000"/>
+                <a:satMod val="350000"/>
+              </a:schemeClr>
+            </a:gs>
+            <a:gs pos="40000">
+              <a:schemeClr val="phClr">
+                <a:tint val="45000"/>
+                <a:shade val="99000"/>
+                <a:satMod val="350000"/>
+              </a:schemeClr>
+            </a:gs>
+            <a:gs pos="100000">
+              <a:schemeClr val="phClr">
+                <a:shade val="20000"/>
+                <a:satMod val="255000"/>
+              </a:schemeClr>
+            </a:gs>
+          </a:gsLst>
+          <a:path path="circle">
+            <a:fillToRect l="50000" t="-80000" r="50000" b="180000"/>
+          </a:path>
+        </a:gradFill>
+        <a:gradFill rotWithShape="1">
+          <a:gsLst>
+            <a:gs pos="0">
+              <a:schemeClr val="phClr">
+                <a:tint val="80000"/>
+                <a:satMod val="300000"/>
+              </a:schemeClr>
+            </a:gs>
+            <a:gs pos="100000">
+              <a:schemeClr val="phClr">
+                <a:shade val="30000"/>
+                <a:satMod val="200000"/>
+              </a:schemeClr>
+            </a:gs>
+          </a:gsLst>
+          <a:path path="circle">
+            <a:fillToRect l="50000" t="50000" r="50000" b="50000"/>
+          </a:path>
+        </a:gradFill>
+      </a:bgFillStyleLst>
+    </a:fmtScheme>
+  </a:themeElements>
+  <a:objectDefaults/>
+  <a:extraClrSchemeLst/>
+</a:theme>
 </file>
</xml_diff>